<commit_message>
updated - small changes
</commit_message>
<xml_diff>
--- a/artifacts/arch/GenAITects - Architecture of GenAI IPE.pptx
+++ b/artifacts/arch/GenAITects - Architecture of GenAI IPE.pptx
@@ -5178,7 +5178,7 @@
         </p:nvSpPr>
         <p:spPr>
           <a:xfrm>
-            <a:off x="4811732" y="839972"/>
+            <a:off x="5264311" y="839972"/>
             <a:ext cx="6764856" cy="1097280"/>
           </a:xfrm>
         </p:spPr>
@@ -5218,8 +5218,8 @@
         </p:blipFill>
         <p:spPr>
           <a:xfrm>
-            <a:off x="-1" y="1"/>
-            <a:ext cx="3997843" cy="6267922"/>
+            <a:off x="124482" y="220463"/>
+            <a:ext cx="5015346" cy="5826997"/>
           </a:xfrm>
           <a:prstGeom prst="rect">
             <a:avLst/>
@@ -5292,7 +5292,7 @@
         </p:nvSpPr>
         <p:spPr>
           <a:xfrm>
-            <a:off x="4811733" y="2101608"/>
+            <a:off x="5264312" y="2101608"/>
             <a:ext cx="6764856" cy="4121887"/>
           </a:xfrm>
         </p:spPr>
@@ -5669,19 +5669,19 @@
         </p:nvSpPr>
         <p:spPr>
           <a:xfrm>
-            <a:off x="559219" y="1115844"/>
-            <a:ext cx="7680960" cy="4631911"/>
+            <a:off x="670560" y="3251201"/>
+            <a:ext cx="7680960" cy="1896191"/>
           </a:xfrm>
         </p:spPr>
         <p:txBody>
           <a:bodyPr anchor="b">
-            <a:normAutofit/>
+            <a:normAutofit fontScale="90000"/>
           </a:bodyPr>
           <a:lstStyle/>
           <a:p>
             <a:r>
-              <a:rPr lang="en-US" sz="6500"/>
-              <a:t>Designing the GenAI Integrated Platform</a:t>
+              <a:rPr lang="en-US" sz="6500" dirty="0"/>
+              <a:t>Designing the GenAI Integrated Platform Environment</a:t>
             </a:r>
           </a:p>
         </p:txBody>
@@ -6015,17 +6015,12 @@
         </p:spPr>
         <p:txBody>
           <a:bodyPr vert="horz" lIns="91440" tIns="45720" rIns="91440" bIns="45720" rtlCol="0" anchor="t">
-            <a:normAutofit/>
+            <a:normAutofit fontScale="90000"/>
           </a:bodyPr>
           <a:lstStyle/>
           <a:p>
-            <a:pPr>
-              <a:lnSpc>
-                <a:spcPct val="90000"/>
-              </a:lnSpc>
-            </a:pPr>
-            <a:r>
-              <a:rPr lang="en-US" sz="3400" dirty="0"/>
+            <a:r>
+              <a:rPr lang="en-US" sz="3700" dirty="0"/>
               <a:t>Conceptualization and Objectives</a:t>
             </a:r>
           </a:p>
@@ -6054,8 +6049,8 @@
         </p:blipFill>
         <p:spPr>
           <a:xfrm>
-            <a:off x="20" y="74429"/>
-            <a:ext cx="4416532" cy="6193494"/>
+            <a:off x="9256" y="83665"/>
+            <a:ext cx="4416532" cy="5993861"/>
           </a:xfrm>
           <a:prstGeom prst="rect">
             <a:avLst/>
@@ -6630,8 +6625,8 @@
         </p:blipFill>
         <p:spPr>
           <a:xfrm>
-            <a:off x="-253882" y="684263"/>
-            <a:ext cx="12982330" cy="6658370"/>
+            <a:off x="120074" y="955739"/>
+            <a:ext cx="11951854" cy="5565134"/>
           </a:xfrm>
           <a:prstGeom prst="rect">
             <a:avLst/>
@@ -6656,24 +6651,19 @@
         </p:nvSpPr>
         <p:spPr>
           <a:xfrm>
-            <a:off x="510032" y="90047"/>
+            <a:off x="630105" y="239200"/>
             <a:ext cx="8617689" cy="701753"/>
           </a:xfrm>
         </p:spPr>
         <p:txBody>
           <a:bodyPr vert="horz" lIns="91440" tIns="45720" rIns="91440" bIns="45720" rtlCol="0" anchor="t">
-            <a:normAutofit fontScale="90000"/>
+            <a:normAutofit/>
           </a:bodyPr>
           <a:lstStyle/>
           <a:p>
-            <a:pPr>
-              <a:lnSpc>
-                <a:spcPct val="90000"/>
-              </a:lnSpc>
-            </a:pPr>
-            <a:r>
-              <a:rPr lang="en-US" sz="3600" dirty="0"/>
-              <a:t>Current to Proposed Solution - Progression</a:t>
+            <a:r>
+              <a:rPr lang="en-US" sz="3700" dirty="0"/>
+              <a:t>AS-IS to Proposed Solution: Progression</a:t>
             </a:r>
           </a:p>
         </p:txBody>
@@ -6729,19 +6719,20 @@
         </p:nvSpPr>
         <p:spPr>
           <a:xfrm>
-            <a:off x="660992" y="100585"/>
+            <a:off x="660992" y="174473"/>
             <a:ext cx="10890929" cy="1097280"/>
           </a:xfrm>
         </p:spPr>
         <p:txBody>
-          <a:bodyPr/>
-          <a:lstStyle/>
-          <a:p>
-            <a:r>
-              <a:rPr lang="en-US" sz="4000" dirty="0"/>
+          <a:bodyPr vert="horz" lIns="91440" tIns="45720" rIns="91440" bIns="45720" rtlCol="0" anchor="t">
+            <a:normAutofit/>
+          </a:bodyPr>
+          <a:lstStyle/>
+          <a:p>
+            <a:r>
+              <a:rPr lang="en-US" sz="3700" dirty="0"/>
               <a:t>System Architecture and Components</a:t>
             </a:r>
-            <a:endParaRPr lang="en-US" dirty="0"/>
           </a:p>
         </p:txBody>
       </p:sp>
@@ -6759,7 +6750,7 @@
         </p:nvSpPr>
         <p:spPr>
           <a:xfrm>
-            <a:off x="4453128" y="3648456"/>
+            <a:off x="4453128" y="4073325"/>
             <a:ext cx="3194304" cy="2368296"/>
           </a:xfrm>
           <a:prstGeom prst="roundRect">
@@ -6874,7 +6865,7 @@
         </p:nvSpPr>
         <p:spPr>
           <a:xfrm>
-            <a:off x="618744" y="3648456"/>
+            <a:off x="618744" y="4073325"/>
             <a:ext cx="3194304" cy="2368296"/>
           </a:xfrm>
           <a:prstGeom prst="roundRect">
@@ -6990,7 +6981,7 @@
         </p:nvSpPr>
         <p:spPr>
           <a:xfrm>
-            <a:off x="2697480" y="1069848"/>
+            <a:off x="2697480" y="1494717"/>
             <a:ext cx="3194304" cy="2368296"/>
           </a:xfrm>
           <a:prstGeom prst="roundRect">
@@ -7102,7 +7093,7 @@
         </p:nvSpPr>
         <p:spPr>
           <a:xfrm>
-            <a:off x="6361176" y="1069848"/>
+            <a:off x="6361176" y="1494717"/>
             <a:ext cx="3194304" cy="2368296"/>
           </a:xfrm>
           <a:prstGeom prst="roundRect">
@@ -7208,7 +7199,7 @@
         </p:nvSpPr>
         <p:spPr>
           <a:xfrm>
-            <a:off x="8604504" y="3648456"/>
+            <a:off x="8604504" y="4073325"/>
             <a:ext cx="3194304" cy="2368296"/>
           </a:xfrm>
           <a:prstGeom prst="roundRect">
@@ -7634,11 +7625,13 @@
           </a:xfrm>
         </p:spPr>
         <p:txBody>
-          <a:bodyPr/>
-          <a:lstStyle/>
-          <a:p>
-            <a:r>
-              <a:rPr lang="en-US" dirty="0"/>
+          <a:bodyPr vert="horz" lIns="91440" tIns="45720" rIns="91440" bIns="45720" rtlCol="0" anchor="t">
+            <a:normAutofit/>
+          </a:bodyPr>
+          <a:lstStyle/>
+          <a:p>
+            <a:r>
+              <a:rPr lang="en-US" sz="3700" dirty="0"/>
               <a:t>Workflow with Human-in-loop</a:t>
             </a:r>
           </a:p>
@@ -7782,21 +7775,15 @@
           </a:xfrm>
         </p:spPr>
         <p:txBody>
-          <a:bodyPr>
+          <a:bodyPr vert="horz" lIns="91440" tIns="45720" rIns="91440" bIns="45720" rtlCol="0" anchor="t">
             <a:normAutofit/>
           </a:bodyPr>
           <a:lstStyle/>
           <a:p>
             <a:r>
-              <a:rPr lang="en-US" b="0" i="0" dirty="0">
-                <a:solidFill>
-                  <a:srgbClr val="222222"/>
-                </a:solidFill>
-                <a:effectLst/>
-              </a:rPr>
-              <a:t>How This Solution Stands Out</a:t>
-            </a:r>
-            <a:endParaRPr lang="en-US" dirty="0"/>
+              <a:rPr lang="en-US" sz="3700" dirty="0"/>
+              <a:t>How This Solution Stands Out?</a:t>
+            </a:r>
           </a:p>
         </p:txBody>
       </p:sp>

</xml_diff>